<commit_message>
lecture 2 session 3 and network data
</commit_message>
<xml_diff>
--- a/lectures/3/2_Information Systems, Dashboards & Data Analytics.pptx
+++ b/lectures/3/2_Information Systems, Dashboards & Data Analytics.pptx
@@ -3610,7 +3610,7 @@
         <a:lstStyle/>
         <a:p>
           <a:r>
-            <a:rPr lang="en-US"/>
+            <a:rPr lang="en-US" dirty="0"/>
             <a:t>Access to and retrieval of data (including data integration)</a:t>
           </a:r>
         </a:p>
@@ -5067,7 +5067,7 @@
             <a:buNone/>
           </a:pPr>
           <a:r>
-            <a:rPr lang="en-US" sz="2500" kern="1200"/>
+            <a:rPr lang="en-US" sz="2500" kern="1200" dirty="0"/>
             <a:t>Access to and retrieval of data (including data integration)</a:t>
           </a:r>
         </a:p>
@@ -9325,7 +9325,7 @@
           <a:p>
             <a:fld id="{73B2889B-A0AC-4482-8592-5C96F2309420}" type="datetimeFigureOut">
               <a:rPr lang="en-US" smtClean="0"/>
-              <a:t>9/8/2021</a:t>
+              <a:t>2/1/2022</a:t>
             </a:fld>
             <a:endParaRPr lang="en-US"/>
           </a:p>
@@ -9502,7 +9502,7 @@
           <a:p>
             <a:fld id="{830EB223-FFC0-462A-A3B8-EAA7CE0F8CBD}" type="datetimeFigureOut">
               <a:rPr lang="en-US" smtClean="0"/>
-              <a:t>9/8/2021</a:t>
+              <a:t>2/1/2022</a:t>
             </a:fld>
             <a:endParaRPr lang="en-US" dirty="0"/>
           </a:p>
@@ -10081,7 +10081,7 @@
           <a:p>
             <a:r>
               <a:rPr lang="en-US" dirty="0"/>
-              <a:t>So what are the limitations of the systems approach to decision making process. </a:t>
+              <a:t>So what are the limitations of the systems approach to the decision-making process? </a:t>
             </a:r>
           </a:p>
           <a:p>
@@ -10090,7 +10090,7 @@
           <a:p>
             <a:r>
               <a:rPr lang="en-US" dirty="0"/>
-              <a:t>Managers wont’ always share their decision making processes, which can make it hard to improve it. (they usually don’t because they don’t want to reveal their trade secret) </a:t>
+              <a:t>Managers won’t’ always share their decision-making process, which can make it hard to improve it. (they usually don’t because they don’t want to reveal their trade secret) </a:t>
             </a:r>
           </a:p>
           <a:p>
@@ -10294,19 +10294,13 @@
           <a:p>
             <a:r>
               <a:rPr lang="en-US" dirty="0"/>
-              <a:t>So what is big data. Can anyone define it? And why do you think there is such a hype regarding big data </a:t>
+              <a:t>So what is big data? Can anyone define it? And why do you think there is such hype regarding big data? </a:t>
             </a:r>
           </a:p>
           <a:p>
             <a:r>
               <a:rPr lang="en-US" dirty="0"/>
-              <a:t>So there is an analogy that is rather famous in the research or statistics, or big data world. </a:t>
-            </a:r>
-          </a:p>
-          <a:p>
-            <a:r>
-              <a:rPr lang="en-US" dirty="0"/>
-              <a:t>Please let me know if you think this analogy is inappropriate. I will take note, and remove it. I won’t take it personal. Please don’t report me because I didn’t come up with this analogy</a:t>
+              <a:t>So there is an analogy that is rather famous in the research or statistics or big data world. </a:t>
             </a:r>
           </a:p>
           <a:p>
@@ -10324,13 +10318,7 @@
           <a:p>
             <a:r>
               <a:rPr lang="en-US" dirty="0"/>
-              <a:t>As I mentioned, I did not come up with this analogy. </a:t>
-            </a:r>
-          </a:p>
-          <a:p>
-            <a:r>
-              <a:rPr lang="en-US" dirty="0"/>
-              <a:t>It was Dan </a:t>
+              <a:t>It quote was by Dan </a:t>
             </a:r>
             <a:r>
               <a:rPr lang="en-US" dirty="0" err="1"/>
@@ -10338,25 +10326,8 @@
             </a:r>
             <a:r>
               <a:rPr lang="en-US" dirty="0"/>
-              <a:t> who is a Professor of Psychology and Behavioral Economics</a:t>
+              <a:t>, a Professor of Psychology and Behavioral Economics </a:t>
             </a:r>
-          </a:p>
-          <a:p>
-            <a:r>
-              <a:rPr lang="en-US" dirty="0"/>
-              <a:t>I am not the first one to say this, and please don’t quote me, quote Dan </a:t>
-            </a:r>
-            <a:r>
-              <a:rPr lang="en-US" dirty="0" err="1"/>
-              <a:t>Ariely</a:t>
-            </a:r>
-            <a:r>
-              <a:rPr lang="en-US" dirty="0"/>
-              <a:t>. </a:t>
-            </a:r>
-          </a:p>
-          <a:p>
-            <a:endParaRPr lang="en-US" dirty="0"/>
           </a:p>
           <a:p>
             <a:r>
@@ -10589,137 +10560,9 @@
           <a:bodyPr/>
           <a:lstStyle/>
           <a:p>
-            <a:pPr marL="342900" marR="0" lvl="0" indent="-342900">
-              <a:lnSpc>
-                <a:spcPct val="200000"/>
-              </a:lnSpc>
-              <a:spcBef>
-                <a:spcPts val="0"/>
-              </a:spcBef>
-              <a:spcAft>
-                <a:spcPts val="0"/>
-              </a:spcAft>
-              <a:buFont typeface="Symbol" panose="05050102010706020507" pitchFamily="18" charset="2"/>
-              <a:buChar char=""/>
-            </a:pPr>
-            <a:r>
-              <a:rPr lang="en-US" sz="1800" kern="1200" dirty="0">
-                <a:effectLst/>
-                <a:latin typeface="Calibri" panose="020F0502020204030204" pitchFamily="34" charset="0"/>
-                <a:ea typeface="Times New Roman" panose="02020603050405020304" pitchFamily="18" charset="0"/>
-                <a:cs typeface="Times New Roman" panose="02020603050405020304" pitchFamily="18" charset="0"/>
-              </a:rPr>
-              <a:t>There are only few cases where you truly need big data</a:t>
-            </a:r>
-          </a:p>
-          <a:p>
-            <a:pPr marL="342900" marR="0" lvl="0" indent="-342900">
-              <a:lnSpc>
-                <a:spcPct val="200000"/>
-              </a:lnSpc>
-              <a:spcBef>
-                <a:spcPts val="0"/>
-              </a:spcBef>
-              <a:spcAft>
-                <a:spcPts val="0"/>
-              </a:spcAft>
-              <a:buFont typeface="Symbol" panose="05050102010706020507" pitchFamily="18" charset="2"/>
-              <a:buChar char=""/>
-            </a:pPr>
-            <a:endParaRPr lang="en-US" sz="1800" kern="1200" dirty="0">
-              <a:effectLst/>
-              <a:latin typeface="Calibri" panose="020F0502020204030204" pitchFamily="34" charset="0"/>
-              <a:ea typeface="Times New Roman" panose="02020603050405020304" pitchFamily="18" charset="0"/>
-              <a:cs typeface="Times New Roman" panose="02020603050405020304" pitchFamily="18" charset="0"/>
-            </a:endParaRPr>
-          </a:p>
-          <a:p>
-            <a:pPr marL="342900" marR="0" lvl="0" indent="-342900">
-              <a:lnSpc>
-                <a:spcPct val="200000"/>
-              </a:lnSpc>
-              <a:spcBef>
-                <a:spcPts val="0"/>
-              </a:spcBef>
-              <a:spcAft>
-                <a:spcPts val="0"/>
-              </a:spcAft>
-              <a:buFont typeface="Symbol" panose="05050102010706020507" pitchFamily="18" charset="2"/>
-              <a:buChar char=""/>
-            </a:pPr>
-            <a:r>
-              <a:rPr lang="en-US" sz="1800" kern="1200" dirty="0">
-                <a:effectLst/>
-                <a:latin typeface="Calibri" panose="020F0502020204030204" pitchFamily="34" charset="0"/>
-                <a:ea typeface="Times New Roman" panose="02020603050405020304" pitchFamily="18" charset="0"/>
-                <a:cs typeface="Times New Roman" panose="02020603050405020304" pitchFamily="18" charset="0"/>
-              </a:rPr>
-              <a:t>99% of events involve less than two viral adoptions </a:t>
-            </a:r>
-          </a:p>
-          <a:p>
-            <a:pPr marL="342900" marR="0" lvl="0" indent="-342900">
-              <a:lnSpc>
-                <a:spcPct val="200000"/>
-              </a:lnSpc>
-              <a:spcBef>
-                <a:spcPts val="0"/>
-              </a:spcBef>
-              <a:spcAft>
-                <a:spcPts val="0"/>
-              </a:spcAft>
-              <a:buFont typeface="Symbol" panose="05050102010706020507" pitchFamily="18" charset="2"/>
-              <a:buChar char=""/>
-            </a:pPr>
-            <a:r>
-              <a:rPr lang="en-US" sz="1800" kern="1200" dirty="0">
-                <a:effectLst/>
-                <a:latin typeface="Calibri" panose="020F0502020204030204" pitchFamily="34" charset="0"/>
-                <a:ea typeface="Times New Roman" panose="02020603050405020304" pitchFamily="18" charset="0"/>
-                <a:cs typeface="Times New Roman" panose="02020603050405020304" pitchFamily="18" charset="0"/>
-              </a:rPr>
-              <a:t>99% of adoption are less one hop from the seed </a:t>
-            </a:r>
-          </a:p>
-          <a:p>
             <a:r>
               <a:rPr lang="en-US" dirty="0"/>
-              <a:t>Every tweet on Twitter for 12 months (1.4 b </a:t>
-            </a:r>
-            <a:r>
-              <a:rPr lang="en-US" dirty="0" err="1"/>
-              <a:t>obs</a:t>
-            </a:r>
-            <a:r>
-              <a:rPr lang="en-US" dirty="0"/>
-              <a:t>)</a:t>
-            </a:r>
-          </a:p>
-          <a:p>
-            <a:pPr marL="171450" indent="-171450">
-              <a:buFont typeface="Wingdings" panose="05000000000000000000" pitchFamily="2" charset="2"/>
-              <a:buChar char="Ø"/>
-            </a:pPr>
-            <a:r>
-              <a:rPr lang="en-US" dirty="0"/>
-              <a:t>100 RTs, ~ 350 K events </a:t>
-            </a:r>
-          </a:p>
-          <a:p>
-            <a:pPr marL="171450" indent="-171450">
-              <a:buFont typeface="Wingdings" panose="05000000000000000000" pitchFamily="2" charset="2"/>
-              <a:buChar char="Ø"/>
-            </a:pPr>
-            <a:endParaRPr lang="en-US" dirty="0"/>
-          </a:p>
-          <a:p>
-            <a:pPr marL="171450" indent="-171450">
-              <a:buFont typeface="Wingdings" panose="05000000000000000000" pitchFamily="2" charset="2"/>
-              <a:buChar char="Ø"/>
-            </a:pPr>
-            <a:r>
-              <a:rPr lang="en-US" dirty="0"/>
-              <a:t>Popularity riven mostly by the size of the largest broadcast. </a:t>
+              <a:t>So I use big data extensively in my research, in which I can give you some first-hand experience. </a:t>
             </a:r>
           </a:p>
         </p:txBody>
@@ -10741,7 +10584,7 @@
           <a:p>
             <a:fld id="{BC849E9A-41F7-4779-A581-48A7C374A227}" type="slidenum">
               <a:rPr lang="en-US" smtClean="0"/>
-              <a:t>24</a:t>
+              <a:t>23</a:t>
             </a:fld>
             <a:endParaRPr lang="en-US" dirty="0"/>
           </a:p>
@@ -10750,7 +10593,7 @@
     </p:spTree>
     <p:extLst>
       <p:ext uri="{BB962C8B-B14F-4D97-AF65-F5344CB8AC3E}">
-        <p14:creationId xmlns:p14="http://schemas.microsoft.com/office/powerpoint/2010/main" val="4195776635"/>
+        <p14:creationId xmlns:p14="http://schemas.microsoft.com/office/powerpoint/2010/main" val="3821855466"/>
       </p:ext>
     </p:extLst>
   </p:cSld>
@@ -10804,13 +10647,159 @@
           <a:bodyPr/>
           <a:lstStyle/>
           <a:p>
+            <a:pPr marL="0" marR="0" lvl="0" indent="0">
+              <a:lnSpc>
+                <a:spcPct val="200000"/>
+              </a:lnSpc>
+              <a:spcBef>
+                <a:spcPts val="0"/>
+              </a:spcBef>
+              <a:spcAft>
+                <a:spcPts val="0"/>
+              </a:spcAft>
+              <a:buFont typeface="Symbol" panose="05050102010706020507" pitchFamily="18" charset="2"/>
+              <a:buNone/>
+            </a:pPr>
+            <a:r>
+              <a:rPr lang="en-US" sz="1800" kern="1200" dirty="0">
+                <a:effectLst/>
+                <a:latin typeface="Calibri" panose="020F0502020204030204" pitchFamily="34" charset="0"/>
+                <a:ea typeface="Times New Roman" panose="02020603050405020304" pitchFamily="18" charset="0"/>
+                <a:cs typeface="Times New Roman" panose="02020603050405020304" pitchFamily="18" charset="0"/>
+              </a:rPr>
+              <a:t>There are only a few cases where you truly need big data</a:t>
+            </a:r>
+          </a:p>
+          <a:p>
+            <a:pPr marL="0" marR="0" lvl="0" indent="0">
+              <a:lnSpc>
+                <a:spcPct val="200000"/>
+              </a:lnSpc>
+              <a:spcBef>
+                <a:spcPts val="0"/>
+              </a:spcBef>
+              <a:spcAft>
+                <a:spcPts val="0"/>
+              </a:spcAft>
+              <a:buFont typeface="Symbol" panose="05050102010706020507" pitchFamily="18" charset="2"/>
+              <a:buNone/>
+            </a:pPr>
+            <a:endParaRPr lang="en-US" sz="1800" kern="1200" dirty="0">
+              <a:effectLst/>
+              <a:latin typeface="Calibri" panose="020F0502020204030204" pitchFamily="34" charset="0"/>
+              <a:ea typeface="Times New Roman" panose="02020603050405020304" pitchFamily="18" charset="0"/>
+              <a:cs typeface="Times New Roman" panose="02020603050405020304" pitchFamily="18" charset="0"/>
+            </a:endParaRPr>
+          </a:p>
+          <a:p>
+            <a:pPr marL="342900" marR="0" lvl="0" indent="-342900">
+              <a:lnSpc>
+                <a:spcPct val="200000"/>
+              </a:lnSpc>
+              <a:spcBef>
+                <a:spcPts val="0"/>
+              </a:spcBef>
+              <a:spcAft>
+                <a:spcPts val="0"/>
+              </a:spcAft>
+              <a:buFont typeface="Symbol" panose="05050102010706020507" pitchFamily="18" charset="2"/>
+              <a:buChar char=""/>
+            </a:pPr>
+            <a:endParaRPr lang="en-US" sz="1800" kern="1200" dirty="0">
+              <a:effectLst/>
+              <a:latin typeface="Calibri" panose="020F0502020204030204" pitchFamily="34" charset="0"/>
+              <a:ea typeface="Times New Roman" panose="02020603050405020304" pitchFamily="18" charset="0"/>
+              <a:cs typeface="Times New Roman" panose="02020603050405020304" pitchFamily="18" charset="0"/>
+            </a:endParaRPr>
+          </a:p>
+          <a:p>
+            <a:pPr marL="342900" marR="0" lvl="0" indent="-342900">
+              <a:lnSpc>
+                <a:spcPct val="200000"/>
+              </a:lnSpc>
+              <a:spcBef>
+                <a:spcPts val="0"/>
+              </a:spcBef>
+              <a:spcAft>
+                <a:spcPts val="0"/>
+              </a:spcAft>
+              <a:buFont typeface="Symbol" panose="05050102010706020507" pitchFamily="18" charset="2"/>
+              <a:buChar char=""/>
+            </a:pPr>
+            <a:r>
+              <a:rPr lang="en-US" sz="1800" kern="1200" dirty="0">
+                <a:effectLst/>
+                <a:latin typeface="Calibri" panose="020F0502020204030204" pitchFamily="34" charset="0"/>
+                <a:ea typeface="Times New Roman" panose="02020603050405020304" pitchFamily="18" charset="0"/>
+                <a:cs typeface="Times New Roman" panose="02020603050405020304" pitchFamily="18" charset="0"/>
+              </a:rPr>
+              <a:t>99% of events involve less than two viral adoptions </a:t>
+            </a:r>
+          </a:p>
+          <a:p>
+            <a:pPr marL="342900" marR="0" lvl="0" indent="-342900">
+              <a:lnSpc>
+                <a:spcPct val="200000"/>
+              </a:lnSpc>
+              <a:spcBef>
+                <a:spcPts val="0"/>
+              </a:spcBef>
+              <a:spcAft>
+                <a:spcPts val="0"/>
+              </a:spcAft>
+              <a:buFont typeface="Symbol" panose="05050102010706020507" pitchFamily="18" charset="2"/>
+              <a:buChar char=""/>
+            </a:pPr>
+            <a:r>
+              <a:rPr lang="en-US" sz="1800" kern="1200" dirty="0">
+                <a:effectLst/>
+                <a:latin typeface="Calibri" panose="020F0502020204030204" pitchFamily="34" charset="0"/>
+                <a:ea typeface="Times New Roman" panose="02020603050405020304" pitchFamily="18" charset="0"/>
+                <a:cs typeface="Times New Roman" panose="02020603050405020304" pitchFamily="18" charset="0"/>
+              </a:rPr>
+              <a:t>99% of adoption are less one hop from the seed </a:t>
+            </a:r>
+          </a:p>
+          <a:p>
             <a:r>
               <a:rPr lang="en-US" dirty="0"/>
-              <a:t>We have already mentioned this in the last class when we talked about data mining. The difference between structure in the sense of dataset, and structure in research design, especially in exploratory research </a:t>
+              <a:t>Every tweet on Twitter for 12 months (1.4 b </a:t>
             </a:r>
-          </a:p>
-          <a:p>
+            <a:r>
+              <a:rPr lang="en-US" dirty="0" err="1"/>
+              <a:t>obs</a:t>
+            </a:r>
+            <a:r>
+              <a:rPr lang="en-US" dirty="0"/>
+              <a:t>)</a:t>
+            </a:r>
+          </a:p>
+          <a:p>
+            <a:pPr marL="171450" indent="-171450">
+              <a:buFont typeface="Wingdings" panose="05000000000000000000" pitchFamily="2" charset="2"/>
+              <a:buChar char="Ø"/>
+            </a:pPr>
+            <a:r>
+              <a:rPr lang="en-US" dirty="0"/>
+              <a:t>100 RTs, ~ 350 K events </a:t>
+            </a:r>
+          </a:p>
+          <a:p>
+            <a:pPr marL="171450" indent="-171450">
+              <a:buFont typeface="Wingdings" panose="05000000000000000000" pitchFamily="2" charset="2"/>
+              <a:buChar char="Ø"/>
+            </a:pPr>
             <a:endParaRPr lang="en-US" dirty="0"/>
+          </a:p>
+          <a:p>
+            <a:pPr marL="171450" indent="-171450">
+              <a:buFont typeface="Wingdings" panose="05000000000000000000" pitchFamily="2" charset="2"/>
+              <a:buChar char="Ø"/>
+            </a:pPr>
+            <a:r>
+              <a:rPr lang="en-US" dirty="0"/>
+              <a:t>Popularity is driven mostly by the size of the largest broadcast. </a:t>
+            </a:r>
           </a:p>
         </p:txBody>
       </p:sp>
@@ -10831,7 +10820,7 @@
           <a:p>
             <a:fld id="{BC849E9A-41F7-4779-A581-48A7C374A227}" type="slidenum">
               <a:rPr lang="en-US" smtClean="0"/>
-              <a:t>25</a:t>
+              <a:t>24</a:t>
             </a:fld>
             <a:endParaRPr lang="en-US" dirty="0"/>
           </a:p>
@@ -10840,7 +10829,7 @@
     </p:spTree>
     <p:extLst>
       <p:ext uri="{BB962C8B-B14F-4D97-AF65-F5344CB8AC3E}">
-        <p14:creationId xmlns:p14="http://schemas.microsoft.com/office/powerpoint/2010/main" val="3791038584"/>
+        <p14:creationId xmlns:p14="http://schemas.microsoft.com/office/powerpoint/2010/main" val="4195776635"/>
       </p:ext>
     </p:extLst>
   </p:cSld>
@@ -10896,44 +10885,20 @@
           <a:p>
             <a:r>
               <a:rPr lang="en-US" dirty="0"/>
-              <a:t>These are key types of unstructured data, which are usually social data</a:t>
+              <a:t>I have already mentioned this in the last class when we talked about data mining. </a:t>
             </a:r>
+          </a:p>
+          <a:p>
+            <a:endParaRPr lang="en-US" dirty="0"/>
           </a:p>
           <a:p>
             <a:r>
               <a:rPr lang="en-US" dirty="0"/>
-              <a:t>Social data can be voice of the customer: </a:t>
+              <a:t>The difference between structure in the sense of dataset, and structure in research design, especially in exploratory research </a:t>
             </a:r>
           </a:p>
           <a:p>
             <a:endParaRPr lang="en-US" dirty="0"/>
-          </a:p>
-          <a:p>
-            <a:endParaRPr lang="en-US" dirty="0"/>
-          </a:p>
-          <a:p>
-            <a:r>
-              <a:rPr lang="en-US" dirty="0"/>
-              <a:t>Which then can be used to do social network analysis. It is a popular tool … </a:t>
-            </a:r>
-          </a:p>
-          <a:p>
-            <a:endParaRPr lang="en-US" dirty="0"/>
-          </a:p>
-          <a:p>
-            <a:r>
-              <a:rPr lang="en-US" dirty="0"/>
-              <a:t>Then, we have smartphone data, which consist of data form texting, and in-store shopping or location-based services. </a:t>
-            </a:r>
-          </a:p>
-          <a:p>
-            <a:endParaRPr lang="en-US" dirty="0"/>
-          </a:p>
-          <a:p>
-            <a:r>
-              <a:rPr lang="en-US" dirty="0"/>
-              <a:t>Today, I will use the 5-min snippet to demonstrate SNA </a:t>
-            </a:r>
           </a:p>
         </p:txBody>
       </p:sp>
@@ -10954,7 +10919,7 @@
           <a:p>
             <a:fld id="{BC849E9A-41F7-4779-A581-48A7C374A227}" type="slidenum">
               <a:rPr lang="en-US" smtClean="0"/>
-              <a:t>26</a:t>
+              <a:t>25</a:t>
             </a:fld>
             <a:endParaRPr lang="en-US" dirty="0"/>
           </a:p>
@@ -10963,7 +10928,7 @@
     </p:spTree>
     <p:extLst>
       <p:ext uri="{BB962C8B-B14F-4D97-AF65-F5344CB8AC3E}">
-        <p14:creationId xmlns:p14="http://schemas.microsoft.com/office/powerpoint/2010/main" val="4276208527"/>
+        <p14:creationId xmlns:p14="http://schemas.microsoft.com/office/powerpoint/2010/main" val="3791038584"/>
       </p:ext>
     </p:extLst>
   </p:cSld>
@@ -11019,17 +10984,17 @@
           <a:p>
             <a:r>
               <a:rPr lang="en-US" dirty="0"/>
-              <a:t>Another type of unstructured data is omni-channel transactional data </a:t>
+              <a:t>These are key types of unstructured data, which are usually social data</a:t>
             </a:r>
-          </a:p>
-          <a:p>
-            <a:endParaRPr lang="en-US" dirty="0"/>
           </a:p>
           <a:p>
             <a:r>
               <a:rPr lang="en-US" dirty="0"/>
-              <a:t>The definition of this type of data is data that are connected to particular purchaser across multiple purchasing channels.</a:t>
+              <a:t>Social data can be voice of the customer: </a:t>
             </a:r>
+          </a:p>
+          <a:p>
+            <a:endParaRPr lang="en-US" dirty="0"/>
           </a:p>
           <a:p>
             <a:endParaRPr lang="en-US" dirty="0"/>
@@ -11037,7 +11002,7 @@
           <a:p>
             <a:r>
               <a:rPr lang="en-US" dirty="0"/>
-              <a:t>Data across different platforms in potentially different formats are collected and tied together. </a:t>
+              <a:t>Which then can be used to do social network analysis. It is a popular tool … </a:t>
             </a:r>
           </a:p>
           <a:p>
@@ -11046,31 +11011,16 @@
           <a:p>
             <a:r>
               <a:rPr lang="en-US" dirty="0"/>
-              <a:t>Has anyone here have a feeling that all your devices are connected / talk to one another? </a:t>
+              <a:t>Then, we have smartphone data, which consist of data form texting, and in-store shopping or location-based services. </a:t>
             </a:r>
+          </a:p>
+          <a:p>
+            <a:endParaRPr lang="en-US" dirty="0"/>
           </a:p>
           <a:p>
             <a:r>
               <a:rPr lang="en-US" dirty="0"/>
-              <a:t>And maybe Facebook knows that you are interested in buying a pair pants when you just talk to your mom about it? </a:t>
-            </a:r>
-          </a:p>
-          <a:p>
-            <a:endParaRPr lang="en-US" dirty="0"/>
-          </a:p>
-          <a:p>
-            <a:r>
-              <a:rPr lang="en-US" dirty="0"/>
-              <a:t>Companies leverage this type of data to get you buy stuffs. Even though it’s hard to connect data across channel, but once you can do it, it’s very powerful. </a:t>
-            </a:r>
-          </a:p>
-          <a:p>
-            <a:endParaRPr lang="en-US" dirty="0"/>
-          </a:p>
-          <a:p>
-            <a:r>
-              <a:rPr lang="en-US" dirty="0"/>
-              <a:t>As we mention in the first few sessions that companies sell your data, this is the type of data that they sell. Instagram, Facebook, Reddit can sell data to Google so they can target their ads even better based on your preference and interests</a:t>
+              <a:t>Today, I will use the 5-min snippet to demonstrate SNA </a:t>
             </a:r>
           </a:p>
         </p:txBody>
@@ -11092,7 +11042,7 @@
           <a:p>
             <a:fld id="{BC849E9A-41F7-4779-A581-48A7C374A227}" type="slidenum">
               <a:rPr lang="en-US" smtClean="0"/>
-              <a:t>27</a:t>
+              <a:t>26</a:t>
             </a:fld>
             <a:endParaRPr lang="en-US" dirty="0"/>
           </a:p>
@@ -11101,7 +11051,7 @@
     </p:spTree>
     <p:extLst>
       <p:ext uri="{BB962C8B-B14F-4D97-AF65-F5344CB8AC3E}">
-        <p14:creationId xmlns:p14="http://schemas.microsoft.com/office/powerpoint/2010/main" val="503478466"/>
+        <p14:creationId xmlns:p14="http://schemas.microsoft.com/office/powerpoint/2010/main" val="4276208527"/>
       </p:ext>
     </p:extLst>
   </p:cSld>
@@ -11157,35 +11107,41 @@
           <a:p>
             <a:r>
               <a:rPr lang="en-US" dirty="0"/>
-              <a:t>These are types of big data analyses. It’s similar to our research design </a:t>
+              <a:t>Another type of unstructured data is omni-channel transactional data </a:t>
             </a:r>
+          </a:p>
+          <a:p>
+            <a:endParaRPr lang="en-US" dirty="0"/>
           </a:p>
           <a:p>
             <a:r>
               <a:rPr lang="en-US" dirty="0"/>
-              <a:t>Can someone remind me what the three research designs are? </a:t>
+              <a:t>The definition of this type of data is data that are connected to a particular purchaser across multiple purchasing channels.</a:t>
             </a:r>
+          </a:p>
+          <a:p>
+            <a:endParaRPr lang="en-US" dirty="0"/>
           </a:p>
           <a:p>
             <a:r>
               <a:rPr lang="en-US" dirty="0"/>
-              <a:t>Exploratory Research </a:t>
+              <a:t>Data across different platforms in potentially different formats are collected and tied together. </a:t>
             </a:r>
+          </a:p>
+          <a:p>
+            <a:endParaRPr lang="en-US" dirty="0"/>
           </a:p>
           <a:p>
             <a:r>
               <a:rPr lang="en-US" dirty="0"/>
-              <a:t>Descriptive Research </a:t>
+              <a:t>Has anyone here have a feeling that all your devices are connected/talk to one another? </a:t>
             </a:r>
           </a:p>
           <a:p>
             <a:r>
               <a:rPr lang="en-US" dirty="0"/>
-              <a:t>Causal Research </a:t>
+              <a:t>And maybe Facebook knows that you are interested in buying a pair of pants when you just talk to your mom about it? </a:t>
             </a:r>
-          </a:p>
-          <a:p>
-            <a:endParaRPr lang="en-US" dirty="0"/>
           </a:p>
           <a:p>
             <a:endParaRPr lang="en-US" dirty="0"/>
@@ -11193,7 +11149,16 @@
           <a:p>
             <a:r>
               <a:rPr lang="en-US" dirty="0"/>
-              <a:t>We have encountered simulation before, can you state some examples?</a:t>
+              <a:t>Companies leverage this type of data to get you to  buy stuff. Even though it’s hard to connect data across channels, but once you can do it, it’s very powerful. </a:t>
+            </a:r>
+          </a:p>
+          <a:p>
+            <a:endParaRPr lang="en-US" dirty="0"/>
+          </a:p>
+          <a:p>
+            <a:r>
+              <a:rPr lang="en-US" dirty="0"/>
+              <a:t>As I mentioned in the first few sessions, companies sell your data, this is the type of data that they sell. Instagram, Facebook, Reddit can sell data to Google so they can target their ads even better based on your preference and interests</a:t>
             </a:r>
           </a:p>
         </p:txBody>
@@ -11215,7 +11180,7 @@
           <a:p>
             <a:fld id="{BC849E9A-41F7-4779-A581-48A7C374A227}" type="slidenum">
               <a:rPr lang="en-US" smtClean="0"/>
-              <a:t>28</a:t>
+              <a:t>27</a:t>
             </a:fld>
             <a:endParaRPr lang="en-US" dirty="0"/>
           </a:p>
@@ -11224,7 +11189,7 @@
     </p:spTree>
     <p:extLst>
       <p:ext uri="{BB962C8B-B14F-4D97-AF65-F5344CB8AC3E}">
-        <p14:creationId xmlns:p14="http://schemas.microsoft.com/office/powerpoint/2010/main" val="3153640166"/>
+        <p14:creationId xmlns:p14="http://schemas.microsoft.com/office/powerpoint/2010/main" val="503478466"/>
       </p:ext>
     </p:extLst>
   </p:cSld>
@@ -11362,7 +11327,46 @@
           <a:bodyPr/>
           <a:lstStyle/>
           <a:p>
+            <a:r>
+              <a:rPr lang="en-US" dirty="0"/>
+              <a:t>These are types of big data analyses. It’s similar to our research design </a:t>
+            </a:r>
+          </a:p>
+          <a:p>
+            <a:r>
+              <a:rPr lang="en-US" dirty="0"/>
+              <a:t>Can someone remind me what the three research designs are? </a:t>
+            </a:r>
+          </a:p>
+          <a:p>
+            <a:r>
+              <a:rPr lang="en-US" dirty="0"/>
+              <a:t>Exploratory Research </a:t>
+            </a:r>
+          </a:p>
+          <a:p>
+            <a:r>
+              <a:rPr lang="en-US" dirty="0"/>
+              <a:t>Descriptive Research </a:t>
+            </a:r>
+          </a:p>
+          <a:p>
+            <a:r>
+              <a:rPr lang="en-US" dirty="0"/>
+              <a:t>Causal Research </a:t>
+            </a:r>
+          </a:p>
+          <a:p>
             <a:endParaRPr lang="en-US" dirty="0"/>
+          </a:p>
+          <a:p>
+            <a:endParaRPr lang="en-US" dirty="0"/>
+          </a:p>
+          <a:p>
+            <a:r>
+              <a:rPr lang="en-US" dirty="0"/>
+              <a:t>We have encountered simulation before, can you state some examples?</a:t>
+            </a:r>
           </a:p>
         </p:txBody>
       </p:sp>
@@ -11383,7 +11387,7 @@
           <a:p>
             <a:fld id="{BC849E9A-41F7-4779-A581-48A7C374A227}" type="slidenum">
               <a:rPr lang="en-US" smtClean="0"/>
-              <a:t>29</a:t>
+              <a:t>28</a:t>
             </a:fld>
             <a:endParaRPr lang="en-US" dirty="0"/>
           </a:p>
@@ -11392,7 +11396,7 @@
     </p:spTree>
     <p:extLst>
       <p:ext uri="{BB962C8B-B14F-4D97-AF65-F5344CB8AC3E}">
-        <p14:creationId xmlns:p14="http://schemas.microsoft.com/office/powerpoint/2010/main" val="4045101307"/>
+        <p14:creationId xmlns:p14="http://schemas.microsoft.com/office/powerpoint/2010/main" val="3153640166"/>
       </p:ext>
     </p:extLst>
   </p:cSld>
@@ -11446,85 +11450,7 @@
           <a:bodyPr/>
           <a:lstStyle/>
           <a:p>
-            <a:r>
-              <a:rPr lang="en-US" dirty="0"/>
-              <a:t>So basically, What could be the potential causes that a restaurant is having a gradual sales decline? Pick a specific method and consider the probable cause</a:t>
-            </a:r>
-          </a:p>
-          <a:p>
-            <a:r>
-              <a:rPr lang="en-US" dirty="0"/>
-              <a:t>Please state the strengths and weaknesses of your method. Then, you also have to offer details how you would approach this problem. I will do an example in class. </a:t>
-            </a:r>
-          </a:p>
-          <a:p>
-            <a:r>
-              <a:rPr lang="en-US" dirty="0"/>
-              <a:t>But you have to do the method associated with the first letter of your last name. Don’t just pick the first one and copy my answer. </a:t>
-            </a:r>
-          </a:p>
-          <a:p>
             <a:endParaRPr lang="en-US" dirty="0"/>
-          </a:p>
-          <a:p>
-            <a:r>
-              <a:rPr lang="en-US" dirty="0"/>
-              <a:t>What are the strengths of secondary data analysis? </a:t>
-            </a:r>
-          </a:p>
-          <a:p>
-            <a:endParaRPr lang="en-US" dirty="0"/>
-          </a:p>
-          <a:p>
-            <a:r>
-              <a:rPr lang="en-US" dirty="0"/>
-              <a:t>So the strength of secondary data analysis is that you can purchase and do it right away, it can be rather fast. It can give you the result right away. </a:t>
-            </a:r>
-          </a:p>
-          <a:p>
-            <a:endParaRPr lang="en-US" dirty="0"/>
-          </a:p>
-          <a:p>
-            <a:r>
-              <a:rPr lang="en-US" dirty="0"/>
-              <a:t>So what about its weaknesses? </a:t>
-            </a:r>
-          </a:p>
-          <a:p>
-            <a:r>
-              <a:rPr lang="en-US" dirty="0"/>
-              <a:t>You don’t have control over what type of data you can get</a:t>
-            </a:r>
-          </a:p>
-          <a:p>
-            <a:r>
-              <a:rPr lang="en-US" dirty="0"/>
-              <a:t>The data can contain a lot measurement errors (surveyors did not do a good job of obtaining the dataset) </a:t>
-            </a:r>
-          </a:p>
-          <a:p>
-            <a:endParaRPr lang="en-US" dirty="0"/>
-          </a:p>
-          <a:p>
-            <a:r>
-              <a:rPr lang="en-US" dirty="0"/>
-              <a:t>And a way to approach this problem using secondary data analysis is that you can get data from Yelp or Google reviews to see the general market trend to see if it happens to other restaurants or just you. </a:t>
-            </a:r>
-          </a:p>
-          <a:p>
-            <a:r>
-              <a:rPr lang="en-US" dirty="0"/>
-              <a:t>Then, you can also see that general market trends by analyzing data from the US labor bureau or other governmental agencies that publish market data</a:t>
-            </a:r>
-          </a:p>
-          <a:p>
-            <a:endParaRPr lang="en-US" dirty="0"/>
-          </a:p>
-          <a:p>
-            <a:r>
-              <a:rPr lang="en-US" dirty="0"/>
-              <a:t>I hope this gives some sense to what should be discussed on Canvas. </a:t>
-            </a:r>
           </a:p>
         </p:txBody>
       </p:sp>
@@ -11545,33 +11471,8 @@
           <a:p>
             <a:fld id="{BC849E9A-41F7-4779-A581-48A7C374A227}" type="slidenum">
               <a:rPr lang="en-US" smtClean="0"/>
-              <a:t>30</a:t>
+              <a:t>29</a:t>
             </a:fld>
-            <a:endParaRPr lang="en-US" dirty="0"/>
-          </a:p>
-        </p:txBody>
-      </p:sp>
-      <p:sp>
-        <p:nvSpPr>
-          <p:cNvPr id="5" name="Footer Placeholder 4">
-            <a:extLst>
-              <a:ext uri="{FF2B5EF4-FFF2-40B4-BE49-F238E27FC236}">
-                <a16:creationId xmlns:a16="http://schemas.microsoft.com/office/drawing/2014/main" id="{12D7A73B-C46B-4D3E-AEFF-0CFB866A6E45}"/>
-              </a:ext>
-            </a:extLst>
-          </p:cNvPr>
-          <p:cNvSpPr>
-            <a:spLocks noGrp="1"/>
-          </p:cNvSpPr>
-          <p:nvPr>
-            <p:ph type="ftr" sz="quarter" idx="4"/>
-          </p:nvPr>
-        </p:nvSpPr>
-        <p:spPr/>
-        <p:txBody>
-          <a:bodyPr/>
-          <a:lstStyle/>
-          <a:p>
             <a:endParaRPr lang="en-US" dirty="0"/>
           </a:p>
         </p:txBody>
@@ -11579,7 +11480,7 @@
     </p:spTree>
     <p:extLst>
       <p:ext uri="{BB962C8B-B14F-4D97-AF65-F5344CB8AC3E}">
-        <p14:creationId xmlns:p14="http://schemas.microsoft.com/office/powerpoint/2010/main" val="1293393342"/>
+        <p14:creationId xmlns:p14="http://schemas.microsoft.com/office/powerpoint/2010/main" val="4045101307"/>
       </p:ext>
     </p:extLst>
   </p:cSld>
@@ -11633,7 +11534,94 @@
           <a:bodyPr/>
           <a:lstStyle/>
           <a:p>
+            <a:r>
+              <a:rPr lang="en-US" dirty="0"/>
+              <a:t>(Read the case)</a:t>
+            </a:r>
+          </a:p>
+          <a:p>
             <a:endParaRPr lang="en-US" dirty="0"/>
+          </a:p>
+          <a:p>
+            <a:r>
+              <a:rPr lang="en-US" dirty="0"/>
+              <a:t>So basically, What could be the potential causes that a restaurant is having a gradual sales decline? Pick a specific method and consider the probable cause</a:t>
+            </a:r>
+          </a:p>
+          <a:p>
+            <a:r>
+              <a:rPr lang="en-US" dirty="0"/>
+              <a:t>Please state the strengths and weaknesses of your method. Then, you also have to offer details on how you would approach this problem. I will do an example in class. </a:t>
+            </a:r>
+          </a:p>
+          <a:p>
+            <a:r>
+              <a:rPr lang="en-US" dirty="0"/>
+              <a:t>But you have to do the method associated with the first letter of your last name. Don’t just pick the first one and copy my answer. </a:t>
+            </a:r>
+          </a:p>
+          <a:p>
+            <a:endParaRPr lang="en-US" dirty="0"/>
+          </a:p>
+          <a:p>
+            <a:r>
+              <a:rPr lang="en-US" dirty="0"/>
+              <a:t>What are the strengths of secondary data analysis? </a:t>
+            </a:r>
+          </a:p>
+          <a:p>
+            <a:endParaRPr lang="en-US" dirty="0"/>
+          </a:p>
+          <a:p>
+            <a:r>
+              <a:rPr lang="en-US" dirty="0"/>
+              <a:t>So the strength of secondary data analysis is that you can purchase and do it right away, it can be rather fast. It can give you the result right away. </a:t>
+            </a:r>
+          </a:p>
+          <a:p>
+            <a:endParaRPr lang="en-US" dirty="0"/>
+          </a:p>
+          <a:p>
+            <a:r>
+              <a:rPr lang="en-US" dirty="0"/>
+              <a:t>So what about its weaknesses? </a:t>
+            </a:r>
+          </a:p>
+          <a:p>
+            <a:r>
+              <a:rPr lang="en-US" dirty="0"/>
+              <a:t>You don’t have control over what type of data you can get</a:t>
+            </a:r>
+          </a:p>
+          <a:p>
+            <a:r>
+              <a:rPr lang="en-US" dirty="0"/>
+              <a:t>The data can contain a lot of measurement errors (surveyors did not do a good job of obtaining the dataset) </a:t>
+            </a:r>
+          </a:p>
+          <a:p>
+            <a:endParaRPr lang="en-US" dirty="0"/>
+          </a:p>
+          <a:p>
+            <a:r>
+              <a:rPr lang="en-US" dirty="0"/>
+              <a:t>And a way to approach this problem using secondary data analysis is that you can get data from Yelp or Google reviews to see the general market trend to see if it happens to other restaurants or just you. </a:t>
+            </a:r>
+          </a:p>
+          <a:p>
+            <a:r>
+              <a:rPr lang="en-US" dirty="0"/>
+              <a:t>Then, you can also see that general market trends by analyzing data from the US labor bureau or other governmental agencies that publish market data</a:t>
+            </a:r>
+          </a:p>
+          <a:p>
+            <a:endParaRPr lang="en-US" dirty="0"/>
+          </a:p>
+          <a:p>
+            <a:r>
+              <a:rPr lang="en-US" dirty="0"/>
+              <a:t>I hope this gives some sense to what should be discussed on Canvas. </a:t>
+            </a:r>
           </a:p>
         </p:txBody>
       </p:sp>
@@ -11654,8 +11642,33 @@
           <a:p>
             <a:fld id="{BC849E9A-41F7-4779-A581-48A7C374A227}" type="slidenum">
               <a:rPr lang="en-US" smtClean="0"/>
-              <a:t>31</a:t>
+              <a:t>30</a:t>
             </a:fld>
+            <a:endParaRPr lang="en-US" dirty="0"/>
+          </a:p>
+        </p:txBody>
+      </p:sp>
+      <p:sp>
+        <p:nvSpPr>
+          <p:cNvPr id="5" name="Footer Placeholder 4">
+            <a:extLst>
+              <a:ext uri="{FF2B5EF4-FFF2-40B4-BE49-F238E27FC236}">
+                <a16:creationId xmlns:a16="http://schemas.microsoft.com/office/drawing/2014/main" id="{12D7A73B-C46B-4D3E-AEFF-0CFB866A6E45}"/>
+              </a:ext>
+            </a:extLst>
+          </p:cNvPr>
+          <p:cNvSpPr>
+            <a:spLocks noGrp="1"/>
+          </p:cNvSpPr>
+          <p:nvPr>
+            <p:ph type="ftr" sz="quarter" idx="4"/>
+          </p:nvPr>
+        </p:nvSpPr>
+        <p:spPr/>
+        <p:txBody>
+          <a:bodyPr/>
+          <a:lstStyle/>
+          <a:p>
             <a:endParaRPr lang="en-US" dirty="0"/>
           </a:p>
         </p:txBody>
@@ -11663,7 +11676,7 @@
     </p:spTree>
     <p:extLst>
       <p:ext uri="{BB962C8B-B14F-4D97-AF65-F5344CB8AC3E}">
-        <p14:creationId xmlns:p14="http://schemas.microsoft.com/office/powerpoint/2010/main" val="4061606116"/>
+        <p14:creationId xmlns:p14="http://schemas.microsoft.com/office/powerpoint/2010/main" val="1293393342"/>
       </p:ext>
     </p:extLst>
   </p:cSld>
@@ -11738,6 +11751,90 @@
           <a:p>
             <a:fld id="{BC849E9A-41F7-4779-A581-48A7C374A227}" type="slidenum">
               <a:rPr lang="en-US" smtClean="0"/>
+              <a:t>31</a:t>
+            </a:fld>
+            <a:endParaRPr lang="en-US" dirty="0"/>
+          </a:p>
+        </p:txBody>
+      </p:sp>
+    </p:spTree>
+    <p:extLst>
+      <p:ext uri="{BB962C8B-B14F-4D97-AF65-F5344CB8AC3E}">
+        <p14:creationId xmlns:p14="http://schemas.microsoft.com/office/powerpoint/2010/main" val="4061606116"/>
+      </p:ext>
+    </p:extLst>
+  </p:cSld>
+  <p:clrMapOvr>
+    <a:masterClrMapping/>
+  </p:clrMapOvr>
+</p:notes>
+</file>
+
+<file path=ppt/notesSlides/notesSlide24.xml><?xml version="1.0" encoding="utf-8"?>
+<p:notes xmlns:a="http://schemas.openxmlformats.org/drawingml/2006/main" xmlns:r="http://schemas.openxmlformats.org/officeDocument/2006/relationships" xmlns:p="http://schemas.openxmlformats.org/presentationml/2006/main">
+  <p:cSld>
+    <p:spTree>
+      <p:nvGrpSpPr>
+        <p:cNvPr id="1" name=""/>
+        <p:cNvGrpSpPr/>
+        <p:nvPr/>
+      </p:nvGrpSpPr>
+      <p:grpSpPr>
+        <a:xfrm>
+          <a:off x="0" y="0"/>
+          <a:ext cx="0" cy="0"/>
+          <a:chOff x="0" y="0"/>
+          <a:chExt cx="0" cy="0"/>
+        </a:xfrm>
+      </p:grpSpPr>
+      <p:sp>
+        <p:nvSpPr>
+          <p:cNvPr id="2" name="Slide Image Placeholder 1"/>
+          <p:cNvSpPr>
+            <a:spLocks noGrp="1" noRot="1" noChangeAspect="1"/>
+          </p:cNvSpPr>
+          <p:nvPr>
+            <p:ph type="sldImg"/>
+          </p:nvPr>
+        </p:nvSpPr>
+        <p:spPr/>
+      </p:sp>
+      <p:sp>
+        <p:nvSpPr>
+          <p:cNvPr id="3" name="Notes Placeholder 2"/>
+          <p:cNvSpPr>
+            <a:spLocks noGrp="1"/>
+          </p:cNvSpPr>
+          <p:nvPr>
+            <p:ph type="body" idx="1"/>
+          </p:nvPr>
+        </p:nvSpPr>
+        <p:spPr/>
+        <p:txBody>
+          <a:bodyPr/>
+          <a:lstStyle/>
+          <a:p>
+            <a:endParaRPr lang="en-US" dirty="0"/>
+          </a:p>
+        </p:txBody>
+      </p:sp>
+      <p:sp>
+        <p:nvSpPr>
+          <p:cNvPr id="4" name="Slide Number Placeholder 3"/>
+          <p:cNvSpPr>
+            <a:spLocks noGrp="1"/>
+          </p:cNvSpPr>
+          <p:nvPr>
+            <p:ph type="sldNum" sz="quarter" idx="5"/>
+          </p:nvPr>
+        </p:nvSpPr>
+        <p:spPr/>
+        <p:txBody>
+          <a:bodyPr/>
+          <a:lstStyle/>
+          <a:p>
+            <a:fld id="{BC849E9A-41F7-4779-A581-48A7C374A227}" type="slidenum">
+              <a:rPr lang="en-US" smtClean="0"/>
               <a:t>32</a:t>
             </a:fld>
             <a:endParaRPr lang="en-US" dirty="0"/>
@@ -11757,7 +11854,7 @@
 </p:notes>
 </file>
 
-<file path=ppt/notesSlides/notesSlide24.xml><?xml version="1.0" encoding="utf-8"?>
+<file path=ppt/notesSlides/notesSlide25.xml><?xml version="1.0" encoding="utf-8"?>
 <p:notes xmlns:a="http://schemas.openxmlformats.org/drawingml/2006/main" xmlns:r="http://schemas.openxmlformats.org/officeDocument/2006/relationships" xmlns:p="http://schemas.openxmlformats.org/presentationml/2006/main">
   <p:cSld>
     <p:spTree>
@@ -12184,7 +12281,7 @@
           <a:p>
             <a:r>
               <a:rPr lang="en-US" dirty="0"/>
-              <a:t>Inexpensive data can be secured quickly, but unknown accuracy for ill-fitting for the problem </a:t>
+              <a:t>Inexpensive data can be secured quickly, but unknown accuracy or ill-fitting for the problem </a:t>
             </a:r>
           </a:p>
           <a:p>
@@ -12544,7 +12641,7 @@
           <a:p>
             <a:r>
               <a:rPr lang="en-US" dirty="0"/>
-              <a:t>You assume that you have already read the definitions of these systems, so I will not repeat it. </a:t>
+              <a:t>I assume that you have already read the definitions of these systems, so I will not repeat it. </a:t>
             </a:r>
           </a:p>
           <a:p>
@@ -12750,7 +12847,7 @@
           <a:p>
             <a:fld id="{80550A73-2B4E-4929-B8DF-7138D6F7260F}" type="datetime1">
               <a:rPr lang="en-US" smtClean="0"/>
-              <a:t>9/8/2021</a:t>
+              <a:t>2/1/2022</a:t>
             </a:fld>
             <a:endParaRPr lang="en-US" dirty="0"/>
           </a:p>
@@ -12952,7 +13049,7 @@
           <a:p>
             <a:fld id="{01028625-83B2-4E84-8A46-D0F4A8727A9E}" type="datetime1">
               <a:rPr lang="en-US" smtClean="0"/>
-              <a:t>9/8/2021</a:t>
+              <a:t>2/1/2022</a:t>
             </a:fld>
             <a:endParaRPr lang="en-US" dirty="0"/>
           </a:p>
@@ -13164,7 +13261,7 @@
           <a:p>
             <a:fld id="{B9402276-CDDE-4077-BD49-9E25CB29DCE3}" type="datetime1">
               <a:rPr lang="en-US" smtClean="0"/>
-              <a:t>9/8/2021</a:t>
+              <a:t>2/1/2022</a:t>
             </a:fld>
             <a:endParaRPr lang="en-US" dirty="0"/>
           </a:p>
@@ -13366,7 +13463,7 @@
           <a:p>
             <a:fld id="{FF5D1DFC-C791-4997-BECF-09F80398C9DB}" type="datetime1">
               <a:rPr lang="en-US" smtClean="0"/>
-              <a:t>9/8/2021</a:t>
+              <a:t>2/1/2022</a:t>
             </a:fld>
             <a:endParaRPr lang="en-US" dirty="0"/>
           </a:p>
@@ -13645,7 +13742,7 @@
           <a:p>
             <a:fld id="{790911EB-61AA-4FA5-9434-3F9656DB3E71}" type="datetime1">
               <a:rPr lang="en-US" smtClean="0"/>
-              <a:t>9/8/2021</a:t>
+              <a:t>2/1/2022</a:t>
             </a:fld>
             <a:endParaRPr lang="en-US" dirty="0"/>
           </a:p>
@@ -13914,7 +14011,7 @@
           <a:p>
             <a:fld id="{6571A58D-DB20-4232-A7BF-E1542AA1D217}" type="datetime1">
               <a:rPr lang="en-US" smtClean="0"/>
-              <a:t>9/8/2021</a:t>
+              <a:t>2/1/2022</a:t>
             </a:fld>
             <a:endParaRPr lang="en-US" dirty="0"/>
           </a:p>
@@ -14330,7 +14427,7 @@
           <a:p>
             <a:fld id="{09E6CFC3-797E-4C43-AC4A-9EA40911BE3A}" type="datetime1">
               <a:rPr lang="en-US" smtClean="0"/>
-              <a:t>9/8/2021</a:t>
+              <a:t>2/1/2022</a:t>
             </a:fld>
             <a:endParaRPr lang="en-US" dirty="0"/>
           </a:p>
@@ -14475,7 +14572,7 @@
           <a:p>
             <a:fld id="{9D5D29C7-E268-4B09-9EA0-1CBCD0C2FB18}" type="datetime1">
               <a:rPr lang="en-US" smtClean="0"/>
-              <a:t>9/8/2021</a:t>
+              <a:t>2/1/2022</a:t>
             </a:fld>
             <a:endParaRPr lang="en-US" dirty="0"/>
           </a:p>
@@ -14592,7 +14689,7 @@
           <a:p>
             <a:fld id="{B62C24B3-A815-494A-8D5E-9AA02E7F066D}" type="datetime1">
               <a:rPr lang="en-US" smtClean="0"/>
-              <a:t>9/8/2021</a:t>
+              <a:t>2/1/2022</a:t>
             </a:fld>
             <a:endParaRPr lang="en-US" dirty="0"/>
           </a:p>
@@ -14907,7 +15004,7 @@
           <a:p>
             <a:fld id="{3B6145B2-FA71-4617-A341-A8B7E99D15BE}" type="datetime1">
               <a:rPr lang="en-US" smtClean="0"/>
-              <a:t>9/8/2021</a:t>
+              <a:t>2/1/2022</a:t>
             </a:fld>
             <a:endParaRPr lang="en-US" dirty="0"/>
           </a:p>
@@ -15203,7 +15300,7 @@
           <a:p>
             <a:fld id="{E2612574-89EB-4971-8843-D2064C5BA652}" type="datetime1">
               <a:rPr lang="en-US" smtClean="0"/>
-              <a:t>9/8/2021</a:t>
+              <a:t>2/1/2022</a:t>
             </a:fld>
             <a:endParaRPr lang="en-US" dirty="0"/>
           </a:p>
@@ -15448,7 +15545,7 @@
           <a:p>
             <a:fld id="{7803D762-7AB1-4F2A-8B20-2C95C37F27B8}" type="datetime1">
               <a:rPr lang="en-US" smtClean="0"/>
-              <a:t>9/8/2021</a:t>
+              <a:t>2/1/2022</a:t>
             </a:fld>
             <a:endParaRPr lang="en-US" dirty="0"/>
           </a:p>
@@ -15980,7 +16077,7 @@
                 <a:ea typeface="+mj-ea"/>
                 <a:cs typeface="+mj-cs"/>
               </a:rPr>
-              <a:t>Where did labor day go?</a:t>
+              <a:t>Wednesday Already?</a:t>
             </a:r>
           </a:p>
         </p:txBody>
@@ -27304,7 +27401,7 @@
           <p:nvPr/>
         </p:nvPicPr>
         <p:blipFill>
-          <a:blip r:embed="rId2">
+          <a:blip r:embed="rId3">
             <a:extLst>
               <a:ext uri="{28A0092B-C50C-407E-A947-70E740481C1C}">
                 <a14:useLocalDpi xmlns:a14="http://schemas.microsoft.com/office/drawing/2010/main" val="0"/>
@@ -27350,7 +27447,7 @@
           <p:nvPr/>
         </p:nvPicPr>
         <p:blipFill>
-          <a:blip r:embed="rId3">
+          <a:blip r:embed="rId4">
             <a:extLst>
               <a:ext uri="{28A0092B-C50C-407E-A947-70E740481C1C}">
                 <a14:useLocalDpi xmlns:a14="http://schemas.microsoft.com/office/drawing/2010/main" val="0"/>
@@ -30656,6 +30753,376 @@
   <p:clrMapOvr>
     <a:masterClrMapping/>
   </p:clrMapOvr>
+  <p:timing>
+    <p:tnLst>
+      <p:par>
+        <p:cTn id="1" dur="indefinite" restart="never" nodeType="tmRoot">
+          <p:childTnLst>
+            <p:seq concurrent="1" nextAc="seek">
+              <p:cTn id="2" dur="indefinite" nodeType="mainSeq">
+                <p:childTnLst>
+                  <p:par>
+                    <p:cTn id="3" fill="hold">
+                      <p:stCondLst>
+                        <p:cond delay="indefinite"/>
+                      </p:stCondLst>
+                      <p:childTnLst>
+                        <p:par>
+                          <p:cTn id="4" fill="hold">
+                            <p:stCondLst>
+                              <p:cond delay="0"/>
+                            </p:stCondLst>
+                            <p:childTnLst>
+                              <p:par>
+                                <p:cTn id="5" presetID="1" presetClass="entr" presetSubtype="0" fill="hold" grpId="0" nodeType="clickEffect">
+                                  <p:stCondLst>
+                                    <p:cond delay="0"/>
+                                  </p:stCondLst>
+                                  <p:childTnLst>
+                                    <p:set>
+                                      <p:cBhvr>
+                                        <p:cTn id="6" dur="1" fill="hold">
+                                          <p:stCondLst>
+                                            <p:cond delay="0"/>
+                                          </p:stCondLst>
+                                        </p:cTn>
+                                        <p:tgtEl>
+                                          <p:spTgt spid="7">
+                                            <p:graphicEl>
+                                              <a:dgm id="{77F6403A-37E4-42FA-920F-31A5A4619650}"/>
+                                            </p:graphicEl>
+                                          </p:spTgt>
+                                        </p:tgtEl>
+                                        <p:attrNameLst>
+                                          <p:attrName>style.visibility</p:attrName>
+                                        </p:attrNameLst>
+                                      </p:cBhvr>
+                                      <p:to>
+                                        <p:strVal val="visible"/>
+                                      </p:to>
+                                    </p:set>
+                                  </p:childTnLst>
+                                </p:cTn>
+                              </p:par>
+                              <p:par>
+                                <p:cTn id="7" presetID="1" presetClass="entr" presetSubtype="0" fill="hold" grpId="0" nodeType="withEffect">
+                                  <p:stCondLst>
+                                    <p:cond delay="0"/>
+                                  </p:stCondLst>
+                                  <p:childTnLst>
+                                    <p:set>
+                                      <p:cBhvr>
+                                        <p:cTn id="8" dur="1" fill="hold">
+                                          <p:stCondLst>
+                                            <p:cond delay="0"/>
+                                          </p:stCondLst>
+                                        </p:cTn>
+                                        <p:tgtEl>
+                                          <p:spTgt spid="7">
+                                            <p:graphicEl>
+                                              <a:dgm id="{DDC23554-61AA-47F2-A97D-545EBFAA719C}"/>
+                                            </p:graphicEl>
+                                          </p:spTgt>
+                                        </p:tgtEl>
+                                        <p:attrNameLst>
+                                          <p:attrName>style.visibility</p:attrName>
+                                        </p:attrNameLst>
+                                      </p:cBhvr>
+                                      <p:to>
+                                        <p:strVal val="visible"/>
+                                      </p:to>
+                                    </p:set>
+                                  </p:childTnLst>
+                                </p:cTn>
+                              </p:par>
+                              <p:par>
+                                <p:cTn id="9" presetID="1" presetClass="entr" presetSubtype="0" fill="hold" grpId="0" nodeType="withEffect">
+                                  <p:stCondLst>
+                                    <p:cond delay="0"/>
+                                  </p:stCondLst>
+                                  <p:childTnLst>
+                                    <p:set>
+                                      <p:cBhvr>
+                                        <p:cTn id="10" dur="1" fill="hold">
+                                          <p:stCondLst>
+                                            <p:cond delay="0"/>
+                                          </p:stCondLst>
+                                        </p:cTn>
+                                        <p:tgtEl>
+                                          <p:spTgt spid="7">
+                                            <p:graphicEl>
+                                              <a:dgm id="{A6EA25DD-ED6F-40CE-88A9-270BA32395AA}"/>
+                                            </p:graphicEl>
+                                          </p:spTgt>
+                                        </p:tgtEl>
+                                        <p:attrNameLst>
+                                          <p:attrName>style.visibility</p:attrName>
+                                        </p:attrNameLst>
+                                      </p:cBhvr>
+                                      <p:to>
+                                        <p:strVal val="visible"/>
+                                      </p:to>
+                                    </p:set>
+                                  </p:childTnLst>
+                                </p:cTn>
+                              </p:par>
+                            </p:childTnLst>
+                          </p:cTn>
+                        </p:par>
+                      </p:childTnLst>
+                    </p:cTn>
+                  </p:par>
+                  <p:par>
+                    <p:cTn id="11" fill="hold">
+                      <p:stCondLst>
+                        <p:cond delay="indefinite"/>
+                      </p:stCondLst>
+                      <p:childTnLst>
+                        <p:par>
+                          <p:cTn id="12" fill="hold">
+                            <p:stCondLst>
+                              <p:cond delay="0"/>
+                            </p:stCondLst>
+                            <p:childTnLst>
+                              <p:par>
+                                <p:cTn id="13" presetID="1" presetClass="entr" presetSubtype="0" fill="hold" grpId="0" nodeType="clickEffect">
+                                  <p:stCondLst>
+                                    <p:cond delay="0"/>
+                                  </p:stCondLst>
+                                  <p:childTnLst>
+                                    <p:set>
+                                      <p:cBhvr>
+                                        <p:cTn id="14" dur="1" fill="hold">
+                                          <p:stCondLst>
+                                            <p:cond delay="0"/>
+                                          </p:stCondLst>
+                                        </p:cTn>
+                                        <p:tgtEl>
+                                          <p:spTgt spid="7">
+                                            <p:graphicEl>
+                                              <a:dgm id="{38B88F72-7191-46E0-9C69-D531F9041445}"/>
+                                            </p:graphicEl>
+                                          </p:spTgt>
+                                        </p:tgtEl>
+                                        <p:attrNameLst>
+                                          <p:attrName>style.visibility</p:attrName>
+                                        </p:attrNameLst>
+                                      </p:cBhvr>
+                                      <p:to>
+                                        <p:strVal val="visible"/>
+                                      </p:to>
+                                    </p:set>
+                                  </p:childTnLst>
+                                </p:cTn>
+                              </p:par>
+                              <p:par>
+                                <p:cTn id="15" presetID="1" presetClass="entr" presetSubtype="0" fill="hold" grpId="0" nodeType="withEffect">
+                                  <p:stCondLst>
+                                    <p:cond delay="0"/>
+                                  </p:stCondLst>
+                                  <p:childTnLst>
+                                    <p:set>
+                                      <p:cBhvr>
+                                        <p:cTn id="16" dur="1" fill="hold">
+                                          <p:stCondLst>
+                                            <p:cond delay="0"/>
+                                          </p:stCondLst>
+                                        </p:cTn>
+                                        <p:tgtEl>
+                                          <p:spTgt spid="7">
+                                            <p:graphicEl>
+                                              <a:dgm id="{B90215A6-5D17-4B0E-8016-AC509CCDC358}"/>
+                                            </p:graphicEl>
+                                          </p:spTgt>
+                                        </p:tgtEl>
+                                        <p:attrNameLst>
+                                          <p:attrName>style.visibility</p:attrName>
+                                        </p:attrNameLst>
+                                      </p:cBhvr>
+                                      <p:to>
+                                        <p:strVal val="visible"/>
+                                      </p:to>
+                                    </p:set>
+                                  </p:childTnLst>
+                                </p:cTn>
+                              </p:par>
+                              <p:par>
+                                <p:cTn id="17" presetID="1" presetClass="entr" presetSubtype="0" fill="hold" grpId="0" nodeType="withEffect">
+                                  <p:stCondLst>
+                                    <p:cond delay="0"/>
+                                  </p:stCondLst>
+                                  <p:childTnLst>
+                                    <p:set>
+                                      <p:cBhvr>
+                                        <p:cTn id="18" dur="1" fill="hold">
+                                          <p:stCondLst>
+                                            <p:cond delay="0"/>
+                                          </p:stCondLst>
+                                        </p:cTn>
+                                        <p:tgtEl>
+                                          <p:spTgt spid="7">
+                                            <p:graphicEl>
+                                              <a:dgm id="{B6C4E658-A507-415E-BC2D-B4C99180C3C4}"/>
+                                            </p:graphicEl>
+                                          </p:spTgt>
+                                        </p:tgtEl>
+                                        <p:attrNameLst>
+                                          <p:attrName>style.visibility</p:attrName>
+                                        </p:attrNameLst>
+                                      </p:cBhvr>
+                                      <p:to>
+                                        <p:strVal val="visible"/>
+                                      </p:to>
+                                    </p:set>
+                                  </p:childTnLst>
+                                </p:cTn>
+                              </p:par>
+                            </p:childTnLst>
+                          </p:cTn>
+                        </p:par>
+                      </p:childTnLst>
+                    </p:cTn>
+                  </p:par>
+                  <p:par>
+                    <p:cTn id="19" fill="hold">
+                      <p:stCondLst>
+                        <p:cond delay="indefinite"/>
+                      </p:stCondLst>
+                      <p:childTnLst>
+                        <p:par>
+                          <p:cTn id="20" fill="hold">
+                            <p:stCondLst>
+                              <p:cond delay="0"/>
+                            </p:stCondLst>
+                            <p:childTnLst>
+                              <p:par>
+                                <p:cTn id="21" presetID="1" presetClass="entr" presetSubtype="0" fill="hold" grpId="0" nodeType="clickEffect">
+                                  <p:stCondLst>
+                                    <p:cond delay="0"/>
+                                  </p:stCondLst>
+                                  <p:childTnLst>
+                                    <p:set>
+                                      <p:cBhvr>
+                                        <p:cTn id="22" dur="1" fill="hold">
+                                          <p:stCondLst>
+                                            <p:cond delay="0"/>
+                                          </p:stCondLst>
+                                        </p:cTn>
+                                        <p:tgtEl>
+                                          <p:spTgt spid="7">
+                                            <p:graphicEl>
+                                              <a:dgm id="{4FD35D95-65CD-49BF-96F3-91104B2A97E4}"/>
+                                            </p:graphicEl>
+                                          </p:spTgt>
+                                        </p:tgtEl>
+                                        <p:attrNameLst>
+                                          <p:attrName>style.visibility</p:attrName>
+                                        </p:attrNameLst>
+                                      </p:cBhvr>
+                                      <p:to>
+                                        <p:strVal val="visible"/>
+                                      </p:to>
+                                    </p:set>
+                                  </p:childTnLst>
+                                </p:cTn>
+                              </p:par>
+                              <p:par>
+                                <p:cTn id="23" presetID="1" presetClass="entr" presetSubtype="0" fill="hold" grpId="0" nodeType="withEffect">
+                                  <p:stCondLst>
+                                    <p:cond delay="0"/>
+                                  </p:stCondLst>
+                                  <p:childTnLst>
+                                    <p:set>
+                                      <p:cBhvr>
+                                        <p:cTn id="24" dur="1" fill="hold">
+                                          <p:stCondLst>
+                                            <p:cond delay="0"/>
+                                          </p:stCondLst>
+                                        </p:cTn>
+                                        <p:tgtEl>
+                                          <p:spTgt spid="7">
+                                            <p:graphicEl>
+                                              <a:dgm id="{9404C2BB-3B7E-4CFF-A44A-62FFD6FE1540}"/>
+                                            </p:graphicEl>
+                                          </p:spTgt>
+                                        </p:tgtEl>
+                                        <p:attrNameLst>
+                                          <p:attrName>style.visibility</p:attrName>
+                                        </p:attrNameLst>
+                                      </p:cBhvr>
+                                      <p:to>
+                                        <p:strVal val="visible"/>
+                                      </p:to>
+                                    </p:set>
+                                  </p:childTnLst>
+                                </p:cTn>
+                              </p:par>
+                              <p:par>
+                                <p:cTn id="25" presetID="1" presetClass="entr" presetSubtype="0" fill="hold" grpId="0" nodeType="withEffect">
+                                  <p:stCondLst>
+                                    <p:cond delay="0"/>
+                                  </p:stCondLst>
+                                  <p:childTnLst>
+                                    <p:set>
+                                      <p:cBhvr>
+                                        <p:cTn id="26" dur="1" fill="hold">
+                                          <p:stCondLst>
+                                            <p:cond delay="0"/>
+                                          </p:stCondLst>
+                                        </p:cTn>
+                                        <p:tgtEl>
+                                          <p:spTgt spid="7">
+                                            <p:graphicEl>
+                                              <a:dgm id="{89409114-7F10-40CF-90E7-2478293DD6A7}"/>
+                                            </p:graphicEl>
+                                          </p:spTgt>
+                                        </p:tgtEl>
+                                        <p:attrNameLst>
+                                          <p:attrName>style.visibility</p:attrName>
+                                        </p:attrNameLst>
+                                      </p:cBhvr>
+                                      <p:to>
+                                        <p:strVal val="visible"/>
+                                      </p:to>
+                                    </p:set>
+                                  </p:childTnLst>
+                                </p:cTn>
+                              </p:par>
+                            </p:childTnLst>
+                          </p:cTn>
+                        </p:par>
+                      </p:childTnLst>
+                    </p:cTn>
+                  </p:par>
+                </p:childTnLst>
+              </p:cTn>
+              <p:prevCondLst>
+                <p:cond evt="onPrev" delay="0">
+                  <p:tgtEl>
+                    <p:sldTgt/>
+                  </p:tgtEl>
+                </p:cond>
+              </p:prevCondLst>
+              <p:nextCondLst>
+                <p:cond evt="onNext" delay="0">
+                  <p:tgtEl>
+                    <p:sldTgt/>
+                  </p:tgtEl>
+                </p:cond>
+              </p:nextCondLst>
+            </p:seq>
+          </p:childTnLst>
+        </p:cTn>
+      </p:par>
+    </p:tnLst>
+    <p:bldLst>
+      <p:bldGraphic spid="7" grpId="0">
+        <p:bldSub>
+          <a:bldDgm bld="one"/>
+        </p:bldSub>
+      </p:bldGraphic>
+    </p:bldLst>
+  </p:timing>
 </p:sld>
 </file>
 
@@ -36732,14 +37199,6 @@
 </file>
 
 <file path=customXml/item2.xml><?xml version="1.0" encoding="utf-8"?>
-<p:properties xmlns:p="http://schemas.microsoft.com/office/2006/metadata/properties" xmlns:xsi="http://www.w3.org/2001/XMLSchema-instance" xmlns:pc="http://schemas.microsoft.com/office/infopath/2007/PartnerControls">
-  <documentManagement>
-    <MediaServiceKeyPoints xmlns="71af3243-3dd4-4a8d-8c0d-dd76da1f02a5" xsi:nil="true"/>
-  </documentManagement>
-</p:properties>
-</file>
-
-<file path=customXml/item3.xml><?xml version="1.0" encoding="utf-8"?>
 <ct:contentTypeSchema xmlns:ct="http://schemas.microsoft.com/office/2006/metadata/contentType" xmlns:ma="http://schemas.microsoft.com/office/2006/metadata/properties/metaAttributes" ct:_="" ma:_="" ma:contentTypeName="Document" ma:contentTypeID="0x01010079F111ED35F8CC479449609E8A0923A6" ma:contentTypeVersion="11" ma:contentTypeDescription="Create a new document." ma:contentTypeScope="" ma:versionID="96291512c1ee715ab617f4c07df79fc1">
   <xsd:schema xmlns:xsd="http://www.w3.org/2001/XMLSchema" xmlns:xs="http://www.w3.org/2001/XMLSchema" xmlns:p="http://schemas.microsoft.com/office/2006/metadata/properties" xmlns:ns2="71af3243-3dd4-4a8d-8c0d-dd76da1f02a5" xmlns:ns3="16c05727-aa75-4e4a-9b5f-8a80a1165891" targetNamespace="http://schemas.microsoft.com/office/2006/metadata/properties" ma:root="true" ma:fieldsID="8256c27c40ca5c40ce1cf6c44f0205df" ns2:_="" ns3:_="">
     <xsd:import namespace="71af3243-3dd4-4a8d-8c0d-dd76da1f02a5"/>
@@ -36950,6 +37409,14 @@
 </ct:contentTypeSchema>
 </file>
 
+<file path=customXml/item3.xml><?xml version="1.0" encoding="utf-8"?>
+<p:properties xmlns:p="http://schemas.microsoft.com/office/2006/metadata/properties" xmlns:xsi="http://www.w3.org/2001/XMLSchema-instance" xmlns:pc="http://schemas.microsoft.com/office/infopath/2007/PartnerControls">
+  <documentManagement>
+    <MediaServiceKeyPoints xmlns="71af3243-3dd4-4a8d-8c0d-dd76da1f02a5" xsi:nil="true"/>
+  </documentManagement>
+</p:properties>
+</file>
+
 <file path=customXml/itemProps1.xml><?xml version="1.0" encoding="utf-8"?>
 <ds:datastoreItem xmlns:ds="http://schemas.openxmlformats.org/officeDocument/2006/customXml" ds:itemID="{5CA875DA-F9FD-4F83-A049-3B1027B542DE}">
   <ds:schemaRefs>
@@ -36959,16 +37426,6 @@
 </file>
 
 <file path=customXml/itemProps2.xml><?xml version="1.0" encoding="utf-8"?>
-<ds:datastoreItem xmlns:ds="http://schemas.openxmlformats.org/officeDocument/2006/customXml" ds:itemID="{03C7D9E6-B0D9-433E-BD46-EB60F64F4DA8}">
-  <ds:schemaRefs>
-    <ds:schemaRef ds:uri="http://schemas.microsoft.com/office/2006/metadata/properties"/>
-    <ds:schemaRef ds:uri="http://schemas.microsoft.com/office/infopath/2007/PartnerControls"/>
-    <ds:schemaRef ds:uri="71af3243-3dd4-4a8d-8c0d-dd76da1f02a5"/>
-  </ds:schemaRefs>
-</ds:datastoreItem>
-</file>
-
-<file path=customXml/itemProps3.xml><?xml version="1.0" encoding="utf-8"?>
 <ds:datastoreItem xmlns:ds="http://schemas.openxmlformats.org/officeDocument/2006/customXml" ds:itemID="{B2AB02E3-5ADF-4BF0-9C1B-35CDF3FE95B0}">
   <ds:schemaRefs>
     <ds:schemaRef ds:uri="http://schemas.microsoft.com/office/2006/metadata/contentType"/>
@@ -36985,4 +37442,14 @@
     <ds:schemaRef ds:uri="http://schemas.microsoft.com/internal/obd"/>
   </ds:schemaRefs>
 </ds:datastoreItem>
+</file>
+
+<file path=customXml/itemProps3.xml><?xml version="1.0" encoding="utf-8"?>
+<ds:datastoreItem xmlns:ds="http://schemas.openxmlformats.org/officeDocument/2006/customXml" ds:itemID="{03C7D9E6-B0D9-433E-BD46-EB60F64F4DA8}">
+  <ds:schemaRefs>
+    <ds:schemaRef ds:uri="http://schemas.microsoft.com/office/2006/metadata/properties"/>
+    <ds:schemaRef ds:uri="http://schemas.microsoft.com/office/infopath/2007/PartnerControls"/>
+    <ds:schemaRef ds:uri="71af3243-3dd4-4a8d-8c0d-dd76da1f02a5"/>
+  </ds:schemaRefs>
+</ds:datastoreItem>
 </file>
</xml_diff>